<commit_message>
Se actualiza untitled y presentacion
</commit_message>
<xml_diff>
--- a/Presentacion_pycon.pptx
+++ b/Presentacion_pycon.pptx
@@ -8,8 +8,9 @@
     <p:sldId id="256" r:id="rId2"/>
     <p:sldId id="257" r:id="rId3"/>
     <p:sldId id="261" r:id="rId4"/>
-    <p:sldId id="259" r:id="rId5"/>
-    <p:sldId id="263" r:id="rId6"/>
+    <p:sldId id="264" r:id="rId5"/>
+    <p:sldId id="259" r:id="rId6"/>
+    <p:sldId id="263" r:id="rId7"/>
   </p:sldIdLst>
   <p:sldSz cx="12192000" cy="6858000"/>
   <p:notesSz cx="6858000" cy="9144000"/>
@@ -263,7 +264,7 @@
           <a:p>
             <a:fld id="{0ABF11AC-70A1-4FB0-AE2B-4BB5945F5A8D}" type="datetimeFigureOut">
               <a:rPr lang="en-US" smtClean="0"/>
-              <a:t>11/28/2022</a:t>
+              <a:t>11/30/2022</a:t>
             </a:fld>
             <a:endParaRPr lang="en-US"/>
           </a:p>
@@ -461,7 +462,7 @@
           <a:p>
             <a:fld id="{0ABF11AC-70A1-4FB0-AE2B-4BB5945F5A8D}" type="datetimeFigureOut">
               <a:rPr lang="en-US" smtClean="0"/>
-              <a:t>11/28/2022</a:t>
+              <a:t>11/30/2022</a:t>
             </a:fld>
             <a:endParaRPr lang="en-US"/>
           </a:p>
@@ -669,7 +670,7 @@
           <a:p>
             <a:fld id="{0ABF11AC-70A1-4FB0-AE2B-4BB5945F5A8D}" type="datetimeFigureOut">
               <a:rPr lang="en-US" smtClean="0"/>
-              <a:t>11/28/2022</a:t>
+              <a:t>11/30/2022</a:t>
             </a:fld>
             <a:endParaRPr lang="en-US"/>
           </a:p>
@@ -867,7 +868,7 @@
           <a:p>
             <a:fld id="{0ABF11AC-70A1-4FB0-AE2B-4BB5945F5A8D}" type="datetimeFigureOut">
               <a:rPr lang="en-US" smtClean="0"/>
-              <a:t>11/28/2022</a:t>
+              <a:t>11/30/2022</a:t>
             </a:fld>
             <a:endParaRPr lang="en-US"/>
           </a:p>
@@ -1142,7 +1143,7 @@
           <a:p>
             <a:fld id="{0ABF11AC-70A1-4FB0-AE2B-4BB5945F5A8D}" type="datetimeFigureOut">
               <a:rPr lang="en-US" smtClean="0"/>
-              <a:t>11/28/2022</a:t>
+              <a:t>11/30/2022</a:t>
             </a:fld>
             <a:endParaRPr lang="en-US"/>
           </a:p>
@@ -1407,7 +1408,7 @@
           <a:p>
             <a:fld id="{0ABF11AC-70A1-4FB0-AE2B-4BB5945F5A8D}" type="datetimeFigureOut">
               <a:rPr lang="en-US" smtClean="0"/>
-              <a:t>11/28/2022</a:t>
+              <a:t>11/30/2022</a:t>
             </a:fld>
             <a:endParaRPr lang="en-US"/>
           </a:p>
@@ -1819,7 +1820,7 @@
           <a:p>
             <a:fld id="{0ABF11AC-70A1-4FB0-AE2B-4BB5945F5A8D}" type="datetimeFigureOut">
               <a:rPr lang="en-US" smtClean="0"/>
-              <a:t>11/28/2022</a:t>
+              <a:t>11/30/2022</a:t>
             </a:fld>
             <a:endParaRPr lang="en-US"/>
           </a:p>
@@ -1960,7 +1961,7 @@
           <a:p>
             <a:fld id="{0ABF11AC-70A1-4FB0-AE2B-4BB5945F5A8D}" type="datetimeFigureOut">
               <a:rPr lang="en-US" smtClean="0"/>
-              <a:t>11/28/2022</a:t>
+              <a:t>11/30/2022</a:t>
             </a:fld>
             <a:endParaRPr lang="en-US"/>
           </a:p>
@@ -2073,7 +2074,7 @@
           <a:p>
             <a:fld id="{0ABF11AC-70A1-4FB0-AE2B-4BB5945F5A8D}" type="datetimeFigureOut">
               <a:rPr lang="en-US" smtClean="0"/>
-              <a:t>11/28/2022</a:t>
+              <a:t>11/30/2022</a:t>
             </a:fld>
             <a:endParaRPr lang="en-US"/>
           </a:p>
@@ -2384,7 +2385,7 @@
           <a:p>
             <a:fld id="{0ABF11AC-70A1-4FB0-AE2B-4BB5945F5A8D}" type="datetimeFigureOut">
               <a:rPr lang="en-US" smtClean="0"/>
-              <a:t>11/28/2022</a:t>
+              <a:t>11/30/2022</a:t>
             </a:fld>
             <a:endParaRPr lang="en-US"/>
           </a:p>
@@ -2672,7 +2673,7 @@
           <a:p>
             <a:fld id="{0ABF11AC-70A1-4FB0-AE2B-4BB5945F5A8D}" type="datetimeFigureOut">
               <a:rPr lang="en-US" smtClean="0"/>
-              <a:t>11/28/2022</a:t>
+              <a:t>11/30/2022</a:t>
             </a:fld>
             <a:endParaRPr lang="en-US"/>
           </a:p>
@@ -2913,7 +2914,7 @@
           <a:p>
             <a:fld id="{0ABF11AC-70A1-4FB0-AE2B-4BB5945F5A8D}" type="datetimeFigureOut">
               <a:rPr lang="en-US" smtClean="0"/>
-              <a:t>11/28/2022</a:t>
+              <a:t>11/30/2022</a:t>
             </a:fld>
             <a:endParaRPr lang="en-US"/>
           </a:p>
@@ -4095,7 +4096,7 @@
           <a:p>
             <a:r>
               <a:rPr lang="es-CL" b="1" dirty="0"/>
-              <a:t>Problemáticas</a:t>
+              <a:t>Sistemas de agua potable Rural(APR)</a:t>
             </a:r>
             <a:endParaRPr lang="en-US" b="1" dirty="0"/>
           </a:p>
@@ -4120,7 +4121,7 @@
         <p:spPr>
           <a:xfrm>
             <a:off x="838200" y="1825625"/>
-            <a:ext cx="10515600" cy="2393449"/>
+            <a:ext cx="10515600" cy="4606706"/>
           </a:xfrm>
         </p:spPr>
         <p:txBody>
@@ -4131,71 +4132,70 @@
           <a:p>
             <a:r>
               <a:rPr lang="es-CL" dirty="0"/>
-              <a:t>1</a:t>
-            </a:r>
-          </a:p>
-          <a:p>
+              <a:t>El </a:t>
+            </a:r>
+            <a:r>
+              <a:rPr lang="es-CL" b="1" dirty="0"/>
+              <a:t>25 de Septiembre de 2015</a:t>
+            </a:r>
             <a:r>
               <a:rPr lang="es-CL" dirty="0"/>
-              <a:t>2</a:t>
-            </a:r>
-          </a:p>
-          <a:p>
+              <a:t> se definieron los Objetivos de Desarrollo Sostenible y sus metas para </a:t>
+            </a:r>
+            <a:r>
+              <a:rPr lang="es-CL" b="1" dirty="0"/>
+              <a:t>15 años</a:t>
+            </a:r>
             <a:r>
               <a:rPr lang="es-CL" dirty="0"/>
-              <a:t>3</a:t>
-            </a:r>
-          </a:p>
-          <a:p>
+              <a:t>.</a:t>
+            </a:r>
+          </a:p>
+          <a:p>
+            <a:r>
+              <a:rPr lang="es-CL" b="1" dirty="0"/>
+              <a:t>3 de cada 10 personas</a:t>
+            </a:r>
             <a:r>
               <a:rPr lang="es-CL" dirty="0"/>
-              <a:t>4</a:t>
-            </a:r>
-          </a:p>
-          <a:p>
-            <a:endParaRPr lang="en-US" dirty="0"/>
-          </a:p>
-        </p:txBody>
-      </p:sp>
-      <p:pic>
-        <p:nvPicPr>
-          <p:cNvPr id="12" name="Graphic 11" descr="Planet Saturn">
-            <a:extLst>
-              <a:ext uri="{FF2B5EF4-FFF2-40B4-BE49-F238E27FC236}">
-                <a16:creationId xmlns:a16="http://schemas.microsoft.com/office/drawing/2014/main" id="{0AB97AEA-0825-1941-9ED6-0AA50AFD160E}"/>
-              </a:ext>
-            </a:extLst>
-          </p:cNvPr>
-          <p:cNvPicPr>
-            <a:picLocks noChangeAspect="1"/>
-          </p:cNvPicPr>
-          <p:nvPr/>
-        </p:nvPicPr>
-        <p:blipFill>
-          <a:blip r:embed="rId2">
-            <a:extLst>
-              <a:ext uri="{28A0092B-C50C-407E-A947-70E740481C1C}">
-                <a14:useLocalDpi xmlns:a14="http://schemas.microsoft.com/office/drawing/2010/main" val="0"/>
-              </a:ext>
-              <a:ext uri="{96DAC541-7B7A-43D3-8B79-37D633B846F1}">
-                <asvg:svgBlip xmlns:asvg="http://schemas.microsoft.com/office/drawing/2016/SVG/main" r:embed="rId3"/>
-              </a:ext>
-            </a:extLst>
-          </a:blip>
-          <a:stretch>
-            <a:fillRect/>
-          </a:stretch>
-        </p:blipFill>
-        <p:spPr>
-          <a:xfrm>
-            <a:off x="9512028" y="589892"/>
-            <a:ext cx="1841772" cy="1841772"/>
-          </a:xfrm>
-          <a:prstGeom prst="rect">
-            <a:avLst/>
-          </a:prstGeom>
-        </p:spPr>
-      </p:pic>
+              <a:t> carecen de acceso a servicios de agua potable seguros.</a:t>
+            </a:r>
+          </a:p>
+          <a:p>
+            <a:r>
+              <a:rPr lang="es-CL" dirty="0"/>
+              <a:t>Aproximadamente </a:t>
+            </a:r>
+            <a:r>
+              <a:rPr lang="es-CL" b="1" dirty="0"/>
+              <a:t>1.000 niños mueren</a:t>
+            </a:r>
+            <a:r>
+              <a:rPr lang="es-CL" dirty="0"/>
+              <a:t> debido a enfermedades asociadas a la falta de higiene</a:t>
+            </a:r>
+          </a:p>
+          <a:p>
+            <a:r>
+              <a:rPr lang="es-CL" dirty="0"/>
+              <a:t>Mas del </a:t>
+            </a:r>
+            <a:r>
+              <a:rPr lang="es-CL" b="1" dirty="0"/>
+              <a:t>80%</a:t>
+            </a:r>
+            <a:r>
+              <a:rPr lang="es-CL" dirty="0"/>
+              <a:t> de las aguas residuales derivadas de actividades humanas terminan en ríos o el mar sin </a:t>
+            </a:r>
+            <a:r>
+              <a:rPr lang="es-CL" b="1" dirty="0"/>
+              <a:t>ningún tratamiento.</a:t>
+            </a:r>
+            <a:endParaRPr lang="es-CL" dirty="0"/>
+          </a:p>
+        </p:txBody>
+      </p:sp>
       <p:sp>
         <p:nvSpPr>
           <p:cNvPr id="9" name="Rectangle 8">
@@ -4328,20 +4328,8 @@
           <a:lstStyle/>
           <a:p>
             <a:r>
-              <a:rPr lang="en-US" b="1" dirty="0"/>
-              <a:t>Data </a:t>
-            </a:r>
-            <a:r>
-              <a:rPr lang="en-US" b="1" dirty="0" err="1"/>
-              <a:t>Minning</a:t>
-            </a:r>
-            <a:r>
-              <a:rPr lang="en-US" b="1" dirty="0"/>
-              <a:t> – Knowledge Discovery in Databases</a:t>
-            </a:r>
-            <a:r>
-              <a:rPr lang="en-US" dirty="0"/>
-              <a:t>(KDD)</a:t>
+              <a:rPr lang="es-CL" b="1" dirty="0"/>
+              <a:t>Metas del ODS 6 – Agua limpia y saneamiento</a:t>
             </a:r>
             <a:endParaRPr lang="en-US" b="1" dirty="0"/>
           </a:p>
@@ -4366,7 +4354,7 @@
         <p:spPr>
           <a:xfrm>
             <a:off x="838200" y="1825625"/>
-            <a:ext cx="10515600" cy="4606705"/>
+            <a:ext cx="10515600" cy="4606706"/>
           </a:xfrm>
         </p:spPr>
         <p:txBody>
@@ -4376,90 +4364,112 @@
           <a:lstStyle/>
           <a:p>
             <a:r>
+              <a:rPr lang="es-CL" dirty="0"/>
+              <a:t>De aquí a </a:t>
+            </a:r>
+            <a:r>
               <a:rPr lang="es-CL" b="1" dirty="0"/>
-              <a:t>Data </a:t>
-            </a:r>
-            <a:r>
-              <a:rPr lang="es-CL" b="1" dirty="0" err="1"/>
-              <a:t>Cleaning</a:t>
+              <a:t>2030</a:t>
+            </a:r>
+            <a:r>
+              <a:rPr lang="es-CL" dirty="0"/>
+              <a:t> se debe lograr el </a:t>
             </a:r>
             <a:r>
               <a:rPr lang="es-CL" b="1" dirty="0"/>
-              <a:t>:</a:t>
-            </a:r>
-          </a:p>
-          <a:p>
-            <a:endParaRPr lang="es-CL" b="1" dirty="0"/>
-          </a:p>
-          <a:p>
+              <a:t>acceso universal</a:t>
+            </a:r>
+            <a:r>
+              <a:rPr lang="es-CL" dirty="0"/>
+              <a:t> y equitativo al agua potable.</a:t>
+            </a:r>
+          </a:p>
+          <a:p>
+            <a:r>
+              <a:rPr lang="es-CL" dirty="0"/>
+              <a:t>En 2030 se debe lograr el </a:t>
+            </a:r>
             <a:r>
               <a:rPr lang="es-CL" b="1" dirty="0"/>
-              <a:t>Data </a:t>
-            </a:r>
-            <a:r>
-              <a:rPr lang="es-CL" b="1" dirty="0" err="1"/>
-              <a:t>Selection</a:t>
+              <a:t>acceso</a:t>
+            </a:r>
+            <a:r>
+              <a:rPr lang="es-CL" dirty="0"/>
+              <a:t> a servicios de </a:t>
             </a:r>
             <a:r>
               <a:rPr lang="es-CL" b="1" dirty="0"/>
-              <a:t> and </a:t>
-            </a:r>
-            <a:r>
-              <a:rPr lang="es-CL" b="1" dirty="0" err="1"/>
-              <a:t>Transformation</a:t>
-            </a:r>
-            <a:endParaRPr lang="es-CL" b="1" dirty="0"/>
-          </a:p>
-          <a:p>
-            <a:endParaRPr lang="es-CL" b="1" dirty="0"/>
-          </a:p>
-          <a:p>
+              <a:t>saneamiento e higiene</a:t>
+            </a:r>
+            <a:r>
+              <a:rPr lang="es-CL" dirty="0"/>
+              <a:t> adecuados y equitativos.</a:t>
+            </a:r>
+          </a:p>
+          <a:p>
+            <a:r>
+              <a:rPr lang="es-CL" dirty="0"/>
+              <a:t>En 2030 se debe haber aumentado el </a:t>
+            </a:r>
             <a:r>
               <a:rPr lang="es-CL" b="1" dirty="0"/>
-              <a:t>Data </a:t>
-            </a:r>
-            <a:r>
-              <a:rPr lang="es-CL" b="1" dirty="0" err="1"/>
-              <a:t>Mining</a:t>
-            </a:r>
-            <a:endParaRPr lang="es-CL" b="1" dirty="0"/>
-          </a:p>
-          <a:p>
-            <a:endParaRPr lang="es-CL" dirty="0"/>
-          </a:p>
-          <a:p>
-            <a:r>
-              <a:rPr lang="es-CL" b="1" dirty="0" err="1"/>
-              <a:t>Pattern</a:t>
+              <a:t>uso eficiente</a:t>
+            </a:r>
+            <a:r>
+              <a:rPr lang="es-CL" dirty="0"/>
+              <a:t> de los </a:t>
             </a:r>
             <a:r>
               <a:rPr lang="es-CL" b="1" dirty="0"/>
-              <a:t> </a:t>
-            </a:r>
-            <a:r>
-              <a:rPr lang="es-CL" b="1" dirty="0" err="1"/>
-              <a:t>Evaluation</a:t>
-            </a:r>
-            <a:endParaRPr lang="es-CL" b="1" dirty="0"/>
-          </a:p>
-          <a:p>
-            <a:endParaRPr lang="es-CL" b="1" dirty="0"/>
-          </a:p>
-          <a:p>
-            <a:r>
-              <a:rPr lang="es-CL" b="1" dirty="0" err="1"/>
-              <a:t>Knowledge</a:t>
-            </a:r>
-            <a:endParaRPr lang="es-CL" b="1" dirty="0"/>
-          </a:p>
-        </p:txBody>
-      </p:sp>
-      <p:sp>
-        <p:nvSpPr>
-          <p:cNvPr id="7" name="Rectangle 6">
-            <a:extLst>
-              <a:ext uri="{FF2B5EF4-FFF2-40B4-BE49-F238E27FC236}">
-                <a16:creationId xmlns:a16="http://schemas.microsoft.com/office/drawing/2014/main" id="{0BE83DDD-8063-8B61-B23D-EAAA3DED6FA5}"/>
+              <a:t>recursos hídricos</a:t>
+            </a:r>
+            <a:r>
+              <a:rPr lang="es-CL" dirty="0"/>
+              <a:t> y asegurar la sostenibilidad de la extracción y el abastecimiento.</a:t>
+            </a:r>
+          </a:p>
+          <a:p>
+            <a:r>
+              <a:rPr lang="es-CL" b="1" dirty="0"/>
+              <a:t>Apoyar</a:t>
+            </a:r>
+            <a:r>
+              <a:rPr lang="es-CL" dirty="0"/>
+              <a:t> y </a:t>
+            </a:r>
+            <a:r>
+              <a:rPr lang="es-CL" b="1" dirty="0"/>
+              <a:t>fortalecer</a:t>
+            </a:r>
+            <a:r>
+              <a:rPr lang="es-CL" dirty="0"/>
+              <a:t> la participación de las </a:t>
+            </a:r>
+            <a:r>
+              <a:rPr lang="es-CL" b="1" dirty="0"/>
+              <a:t>comunidades locales</a:t>
+            </a:r>
+            <a:r>
+              <a:rPr lang="es-CL" dirty="0"/>
+              <a:t> en la mejora de la </a:t>
+            </a:r>
+            <a:r>
+              <a:rPr lang="es-CL" b="1" dirty="0"/>
+              <a:t>gestión del agua</a:t>
+            </a:r>
+            <a:r>
+              <a:rPr lang="es-CL" dirty="0"/>
+              <a:t> y el saneamiento.</a:t>
+            </a:r>
+          </a:p>
+        </p:txBody>
+      </p:sp>
+      <p:sp>
+        <p:nvSpPr>
+          <p:cNvPr id="9" name="Rectangle 8">
+            <a:extLst>
+              <a:ext uri="{FF2B5EF4-FFF2-40B4-BE49-F238E27FC236}">
+                <a16:creationId xmlns:a16="http://schemas.microsoft.com/office/drawing/2014/main" id="{5C987AA3-3F1B-0634-11DA-F7A5FFA450B2}"/>
               </a:ext>
             </a:extLst>
           </p:cNvPr>
@@ -4537,6 +4547,264 @@
     </p:spTree>
     <p:extLst>
       <p:ext uri="{BB962C8B-B14F-4D97-AF65-F5344CB8AC3E}">
+        <p14:creationId xmlns:p14="http://schemas.microsoft.com/office/powerpoint/2010/main" val="3364783855"/>
+      </p:ext>
+    </p:extLst>
+  </p:cSld>
+  <p:clrMapOvr>
+    <a:masterClrMapping/>
+  </p:clrMapOvr>
+</p:sld>
+</file>
+
+<file path=ppt/slides/slide5.xml><?xml version="1.0" encoding="utf-8"?>
+<p:sld xmlns:a="http://schemas.openxmlformats.org/drawingml/2006/main" xmlns:r="http://schemas.openxmlformats.org/officeDocument/2006/relationships" xmlns:p="http://schemas.openxmlformats.org/presentationml/2006/main">
+  <p:cSld>
+    <p:spTree>
+      <p:nvGrpSpPr>
+        <p:cNvPr id="1" name=""/>
+        <p:cNvGrpSpPr/>
+        <p:nvPr/>
+      </p:nvGrpSpPr>
+      <p:grpSpPr>
+        <a:xfrm>
+          <a:off x="0" y="0"/>
+          <a:ext cx="0" cy="0"/>
+          <a:chOff x="0" y="0"/>
+          <a:chExt cx="0" cy="0"/>
+        </a:xfrm>
+      </p:grpSpPr>
+      <p:sp>
+        <p:nvSpPr>
+          <p:cNvPr id="2" name="Title 1">
+            <a:extLst>
+              <a:ext uri="{FF2B5EF4-FFF2-40B4-BE49-F238E27FC236}">
+                <a16:creationId xmlns:a16="http://schemas.microsoft.com/office/drawing/2014/main" id="{1B0E867C-56AC-C801-99EE-27866334A2B5}"/>
+              </a:ext>
+            </a:extLst>
+          </p:cNvPr>
+          <p:cNvSpPr>
+            <a:spLocks noGrp="1"/>
+          </p:cNvSpPr>
+          <p:nvPr>
+            <p:ph type="title"/>
+          </p:nvPr>
+        </p:nvSpPr>
+        <p:spPr/>
+        <p:txBody>
+          <a:bodyPr/>
+          <a:lstStyle/>
+          <a:p>
+            <a:r>
+              <a:rPr lang="en-US" b="1" dirty="0"/>
+              <a:t>Data </a:t>
+            </a:r>
+            <a:r>
+              <a:rPr lang="en-US" b="1" dirty="0" err="1"/>
+              <a:t>Minning</a:t>
+            </a:r>
+            <a:r>
+              <a:rPr lang="en-US" b="1" dirty="0"/>
+              <a:t> – Knowledge Discovery in Databases</a:t>
+            </a:r>
+            <a:r>
+              <a:rPr lang="en-US" dirty="0"/>
+              <a:t>(KDD)</a:t>
+            </a:r>
+            <a:endParaRPr lang="en-US" b="1" dirty="0"/>
+          </a:p>
+        </p:txBody>
+      </p:sp>
+      <p:sp>
+        <p:nvSpPr>
+          <p:cNvPr id="3" name="Content Placeholder 2">
+            <a:extLst>
+              <a:ext uri="{FF2B5EF4-FFF2-40B4-BE49-F238E27FC236}">
+                <a16:creationId xmlns:a16="http://schemas.microsoft.com/office/drawing/2014/main" id="{A5330CAA-E1FF-BF21-CDBF-D9531268B9B2}"/>
+              </a:ext>
+            </a:extLst>
+          </p:cNvPr>
+          <p:cNvSpPr>
+            <a:spLocks noGrp="1"/>
+          </p:cNvSpPr>
+          <p:nvPr>
+            <p:ph idx="1"/>
+          </p:nvPr>
+        </p:nvSpPr>
+        <p:spPr>
+          <a:xfrm>
+            <a:off x="838200" y="1825625"/>
+            <a:ext cx="10515600" cy="4606705"/>
+          </a:xfrm>
+        </p:spPr>
+        <p:txBody>
+          <a:bodyPr>
+            <a:normAutofit/>
+          </a:bodyPr>
+          <a:lstStyle/>
+          <a:p>
+            <a:r>
+              <a:rPr lang="es-CL" b="1" dirty="0"/>
+              <a:t>Data </a:t>
+            </a:r>
+            <a:r>
+              <a:rPr lang="es-CL" b="1" dirty="0" err="1"/>
+              <a:t>Cleaning</a:t>
+            </a:r>
+            <a:r>
+              <a:rPr lang="es-CL" b="1" dirty="0"/>
+              <a:t>:</a:t>
+            </a:r>
+          </a:p>
+          <a:p>
+            <a:endParaRPr lang="es-CL" b="1" dirty="0"/>
+          </a:p>
+          <a:p>
+            <a:r>
+              <a:rPr lang="es-CL" b="1" dirty="0"/>
+              <a:t>Data </a:t>
+            </a:r>
+            <a:r>
+              <a:rPr lang="es-CL" b="1" dirty="0" err="1"/>
+              <a:t>Selection</a:t>
+            </a:r>
+            <a:r>
+              <a:rPr lang="es-CL" b="1" dirty="0"/>
+              <a:t> and </a:t>
+            </a:r>
+            <a:r>
+              <a:rPr lang="es-CL" b="1" dirty="0" err="1"/>
+              <a:t>Transformation</a:t>
+            </a:r>
+            <a:endParaRPr lang="es-CL" b="1" dirty="0"/>
+          </a:p>
+          <a:p>
+            <a:endParaRPr lang="es-CL" b="1" dirty="0"/>
+          </a:p>
+          <a:p>
+            <a:r>
+              <a:rPr lang="es-CL" b="1" dirty="0"/>
+              <a:t>Data </a:t>
+            </a:r>
+            <a:r>
+              <a:rPr lang="es-CL" b="1" dirty="0" err="1"/>
+              <a:t>Mining</a:t>
+            </a:r>
+            <a:endParaRPr lang="es-CL" b="1" dirty="0"/>
+          </a:p>
+          <a:p>
+            <a:endParaRPr lang="es-CL" dirty="0"/>
+          </a:p>
+          <a:p>
+            <a:r>
+              <a:rPr lang="es-CL" b="1" dirty="0" err="1"/>
+              <a:t>Pattern</a:t>
+            </a:r>
+            <a:r>
+              <a:rPr lang="es-CL" b="1" dirty="0"/>
+              <a:t> </a:t>
+            </a:r>
+            <a:r>
+              <a:rPr lang="es-CL" b="1" dirty="0" err="1"/>
+              <a:t>Evaluation</a:t>
+            </a:r>
+            <a:endParaRPr lang="es-CL" b="1" dirty="0"/>
+          </a:p>
+          <a:p>
+            <a:endParaRPr lang="es-CL" b="1" dirty="0"/>
+          </a:p>
+          <a:p>
+            <a:r>
+              <a:rPr lang="es-CL" b="1" dirty="0" err="1"/>
+              <a:t>Knowledge</a:t>
+            </a:r>
+            <a:endParaRPr lang="es-CL" b="1" dirty="0"/>
+          </a:p>
+        </p:txBody>
+      </p:sp>
+      <p:sp>
+        <p:nvSpPr>
+          <p:cNvPr id="7" name="Rectangle 6">
+            <a:extLst>
+              <a:ext uri="{FF2B5EF4-FFF2-40B4-BE49-F238E27FC236}">
+                <a16:creationId xmlns:a16="http://schemas.microsoft.com/office/drawing/2014/main" id="{0BE83DDD-8063-8B61-B23D-EAAA3DED6FA5}"/>
+              </a:ext>
+            </a:extLst>
+          </p:cNvPr>
+          <p:cNvSpPr/>
+          <p:nvPr/>
+        </p:nvSpPr>
+        <p:spPr>
+          <a:xfrm>
+            <a:off x="0" y="6432331"/>
+            <a:ext cx="12192000" cy="425669"/>
+          </a:xfrm>
+          <a:prstGeom prst="rect">
+            <a:avLst/>
+          </a:prstGeom>
+          <a:gradFill flip="none" rotWithShape="1">
+            <a:gsLst>
+              <a:gs pos="0">
+                <a:schemeClr val="accent1">
+                  <a:lumMod val="75000"/>
+                  <a:shade val="30000"/>
+                  <a:satMod val="115000"/>
+                </a:schemeClr>
+              </a:gs>
+              <a:gs pos="50000">
+                <a:schemeClr val="accent1">
+                  <a:lumMod val="75000"/>
+                  <a:shade val="67500"/>
+                  <a:satMod val="115000"/>
+                </a:schemeClr>
+              </a:gs>
+              <a:gs pos="100000">
+                <a:schemeClr val="accent1">
+                  <a:lumMod val="75000"/>
+                  <a:shade val="100000"/>
+                  <a:satMod val="115000"/>
+                </a:schemeClr>
+              </a:gs>
+            </a:gsLst>
+            <a:lin ang="13500000" scaled="1"/>
+            <a:tileRect/>
+          </a:gradFill>
+          <a:ln>
+            <a:solidFill>
+              <a:schemeClr val="accent1">
+                <a:lumMod val="75000"/>
+              </a:schemeClr>
+            </a:solidFill>
+          </a:ln>
+        </p:spPr>
+        <p:style>
+          <a:lnRef idx="2">
+            <a:schemeClr val="accent1">
+              <a:shade val="50000"/>
+            </a:schemeClr>
+          </a:lnRef>
+          <a:fillRef idx="1">
+            <a:schemeClr val="accent1"/>
+          </a:fillRef>
+          <a:effectRef idx="0">
+            <a:schemeClr val="accent1"/>
+          </a:effectRef>
+          <a:fontRef idx="minor">
+            <a:schemeClr val="lt1"/>
+          </a:fontRef>
+        </p:style>
+        <p:txBody>
+          <a:bodyPr rtlCol="0" anchor="ctr"/>
+          <a:lstStyle/>
+          <a:p>
+            <a:pPr algn="ctr"/>
+            <a:endParaRPr lang="en-US"/>
+          </a:p>
+        </p:txBody>
+      </p:sp>
+    </p:spTree>
+    <p:extLst>
+      <p:ext uri="{BB962C8B-B14F-4D97-AF65-F5344CB8AC3E}">
         <p14:creationId xmlns:p14="http://schemas.microsoft.com/office/powerpoint/2010/main" val="4106857504"/>
       </p:ext>
     </p:extLst>
@@ -4547,7 +4815,7 @@
 </p:sld>
 </file>
 
-<file path=ppt/slides/slide5.xml><?xml version="1.0" encoding="utf-8"?>
+<file path=ppt/slides/slide6.xml><?xml version="1.0" encoding="utf-8"?>
 <p:sld xmlns:a="http://schemas.openxmlformats.org/drawingml/2006/main" xmlns:r="http://schemas.openxmlformats.org/officeDocument/2006/relationships" xmlns:p="http://schemas.openxmlformats.org/presentationml/2006/main">
   <p:cSld>
     <p:spTree>

</xml_diff>